<commit_message>
- cleaning language related to 'locus' in term labels and definitions (to use only in reference to a location, not a feature) - adding ppt slides for VMC alignment docs
</commit_message>
<xml_diff>
--- a/docs/VMC-GENO ApoE example genotype.pptx
+++ b/docs/VMC-GENO ApoE example genotype.pptx
@@ -4119,7 +4119,7 @@
             </a:r>
             <a:r>
               <a:rPr lang="en-US" sz="1200" dirty="0" smtClean="0"/>
-              <a:t>= genotype composition</a:t>
+              <a:t>= genotype components</a:t>
             </a:r>
           </a:p>
           <a:p>
@@ -4464,7 +4464,7 @@
             </a:r>
             <a:r>
               <a:rPr lang="en-US" sz="1200" dirty="0" smtClean="0"/>
-              <a:t>= genotype composition</a:t>
+              <a:t>= genotype components</a:t>
             </a:r>
           </a:p>
           <a:p>

</xml_diff>

<commit_message>
fixing issue with faldo part of the apoE example
</commit_message>
<xml_diff>
--- a/docs/VMC-GENO ApoE example genotype.pptx
+++ b/docs/VMC-GENO ApoE example genotype.pptx
@@ -291,7 +291,7 @@
           <a:p>
             <a:fld id="{035C7BB4-88CA-47C0-B81D-19F53C62A555}" type="datetimeFigureOut">
               <a:rPr lang="en-US" smtClean="0"/>
-              <a:t>10/9/2017</a:t>
+              <a:t>3/20/2018</a:t>
             </a:fld>
             <a:endParaRPr lang="en-US"/>
           </a:p>
@@ -461,7 +461,7 @@
           <a:p>
             <a:fld id="{035C7BB4-88CA-47C0-B81D-19F53C62A555}" type="datetimeFigureOut">
               <a:rPr lang="en-US" smtClean="0"/>
-              <a:t>10/9/2017</a:t>
+              <a:t>3/20/2018</a:t>
             </a:fld>
             <a:endParaRPr lang="en-US"/>
           </a:p>
@@ -641,7 +641,7 @@
           <a:p>
             <a:fld id="{035C7BB4-88CA-47C0-B81D-19F53C62A555}" type="datetimeFigureOut">
               <a:rPr lang="en-US" smtClean="0"/>
-              <a:t>10/9/2017</a:t>
+              <a:t>3/20/2018</a:t>
             </a:fld>
             <a:endParaRPr lang="en-US"/>
           </a:p>
@@ -811,7 +811,7 @@
           <a:p>
             <a:fld id="{035C7BB4-88CA-47C0-B81D-19F53C62A555}" type="datetimeFigureOut">
               <a:rPr lang="en-US" smtClean="0"/>
-              <a:t>10/9/2017</a:t>
+              <a:t>3/20/2018</a:t>
             </a:fld>
             <a:endParaRPr lang="en-US"/>
           </a:p>
@@ -1057,7 +1057,7 @@
           <a:p>
             <a:fld id="{035C7BB4-88CA-47C0-B81D-19F53C62A555}" type="datetimeFigureOut">
               <a:rPr lang="en-US" smtClean="0"/>
-              <a:t>10/9/2017</a:t>
+              <a:t>3/20/2018</a:t>
             </a:fld>
             <a:endParaRPr lang="en-US"/>
           </a:p>
@@ -1345,7 +1345,7 @@
           <a:p>
             <a:fld id="{035C7BB4-88CA-47C0-B81D-19F53C62A555}" type="datetimeFigureOut">
               <a:rPr lang="en-US" smtClean="0"/>
-              <a:t>10/9/2017</a:t>
+              <a:t>3/20/2018</a:t>
             </a:fld>
             <a:endParaRPr lang="en-US"/>
           </a:p>
@@ -1767,7 +1767,7 @@
           <a:p>
             <a:fld id="{035C7BB4-88CA-47C0-B81D-19F53C62A555}" type="datetimeFigureOut">
               <a:rPr lang="en-US" smtClean="0"/>
-              <a:t>10/9/2017</a:t>
+              <a:t>3/20/2018</a:t>
             </a:fld>
             <a:endParaRPr lang="en-US"/>
           </a:p>
@@ -1885,7 +1885,7 @@
           <a:p>
             <a:fld id="{035C7BB4-88CA-47C0-B81D-19F53C62A555}" type="datetimeFigureOut">
               <a:rPr lang="en-US" smtClean="0"/>
-              <a:t>10/9/2017</a:t>
+              <a:t>3/20/2018</a:t>
             </a:fld>
             <a:endParaRPr lang="en-US"/>
           </a:p>
@@ -1980,7 +1980,7 @@
           <a:p>
             <a:fld id="{035C7BB4-88CA-47C0-B81D-19F53C62A555}" type="datetimeFigureOut">
               <a:rPr lang="en-US" smtClean="0"/>
-              <a:t>10/9/2017</a:t>
+              <a:t>3/20/2018</a:t>
             </a:fld>
             <a:endParaRPr lang="en-US"/>
           </a:p>
@@ -2257,7 +2257,7 @@
           <a:p>
             <a:fld id="{035C7BB4-88CA-47C0-B81D-19F53C62A555}" type="datetimeFigureOut">
               <a:rPr lang="en-US" smtClean="0"/>
-              <a:t>10/9/2017</a:t>
+              <a:t>3/20/2018</a:t>
             </a:fld>
             <a:endParaRPr lang="en-US"/>
           </a:p>
@@ -2510,7 +2510,7 @@
           <a:p>
             <a:fld id="{035C7BB4-88CA-47C0-B81D-19F53C62A555}" type="datetimeFigureOut">
               <a:rPr lang="en-US" smtClean="0"/>
-              <a:t>10/9/2017</a:t>
+              <a:t>3/20/2018</a:t>
             </a:fld>
             <a:endParaRPr lang="en-US"/>
           </a:p>
@@ -2723,7 +2723,7 @@
           <a:p>
             <a:fld id="{035C7BB4-88CA-47C0-B81D-19F53C62A555}" type="datetimeFigureOut">
               <a:rPr lang="en-US" smtClean="0"/>
-              <a:t>10/9/2017</a:t>
+              <a:t>3/20/2018</a:t>
             </a:fld>
             <a:endParaRPr lang="en-US"/>
           </a:p>
@@ -3521,11 +3521,7 @@
             </a:pPr>
             <a:r>
               <a:rPr lang="en-US" sz="1400" u="sng" dirty="0" smtClean="0"/>
-              <a:t>rs7412 L</a:t>
-            </a:r>
-            <a:r>
-              <a:rPr lang="en-US" sz="1400" u="sng" dirty="0" smtClean="0"/>
-              <a:t>ocation</a:t>
+              <a:t>rs7412 Location</a:t>
             </a:r>
             <a:endParaRPr lang="en-US" sz="1400" u="sng" dirty="0"/>
           </a:p>
@@ -3601,19 +3597,7 @@
           <a:p>
             <a:r>
               <a:rPr lang="en-US" dirty="0" smtClean="0"/>
-              <a:t>ɛ2 </a:t>
-            </a:r>
-            <a:r>
-              <a:rPr lang="en-US" dirty="0" smtClean="0"/>
-              <a:t>/</a:t>
-            </a:r>
-            <a:r>
-              <a:rPr lang="en-US" dirty="0" smtClean="0"/>
-              <a:t> ɛ3</a:t>
-            </a:r>
-            <a:r>
-              <a:rPr lang="en-US" dirty="0" smtClean="0"/>
-              <a:t> Genotype</a:t>
+              <a:t>ɛ2 / ɛ3 Genotype</a:t>
             </a:r>
             <a:endParaRPr lang="en-US" dirty="0"/>
           </a:p>
@@ -3705,7 +3689,7 @@
         <p:spPr>
           <a:xfrm>
             <a:off x="2112779" y="2514600"/>
-            <a:ext cx="4516621" cy="461665"/>
+            <a:ext cx="5206041" cy="461665"/>
           </a:xfrm>
           <a:prstGeom prst="rect">
             <a:avLst/>
@@ -3724,7 +3708,19 @@
             </a:r>
             <a:r>
               <a:rPr lang="en-US" sz="2400" dirty="0" smtClean="0"/>
-              <a:t>Exemplar </a:t>
+              <a:t>The</a:t>
+            </a:r>
+            <a:r>
+              <a:rPr lang="en-US" sz="2400" b="1" dirty="0" smtClean="0"/>
+              <a:t> </a:t>
+            </a:r>
+            <a:r>
+              <a:rPr lang="en-US" sz="2400" dirty="0"/>
+              <a:t>e</a:t>
+            </a:r>
+            <a:r>
+              <a:rPr lang="en-US" sz="2400" dirty="0" smtClean="0"/>
+              <a:t>xemplar </a:t>
             </a:r>
             <a:r>
               <a:rPr lang="en-US" sz="2400" dirty="0" err="1" smtClean="0"/>
@@ -3732,7 +3728,11 @@
             </a:r>
             <a:r>
               <a:rPr lang="en-US" sz="2400" dirty="0" smtClean="0"/>
-              <a:t> Genotype</a:t>
+              <a:t> </a:t>
+            </a:r>
+            <a:r>
+              <a:rPr lang="en-US" sz="2400" dirty="0" smtClean="0"/>
+              <a:t>‘Genotype’</a:t>
             </a:r>
             <a:endParaRPr lang="en-US" sz="2400" dirty="0"/>
           </a:p>
@@ -3809,19 +3809,7 @@
             </a:r>
             <a:r>
               <a:rPr lang="en-US" sz="2400" dirty="0" smtClean="0"/>
-              <a:t>ɛ</a:t>
-            </a:r>
-            <a:r>
-              <a:rPr lang="en-US" sz="2400" dirty="0" smtClean="0"/>
-              <a:t>2/</a:t>
-            </a:r>
-            <a:r>
-              <a:rPr lang="en-US" sz="2400" dirty="0" smtClean="0"/>
-              <a:t>ɛ</a:t>
-            </a:r>
-            <a:r>
-              <a:rPr lang="en-US" sz="2400" dirty="0" smtClean="0"/>
-              <a:t>3 </a:t>
+              <a:t>ɛ2/ɛ3 </a:t>
             </a:r>
             <a:r>
               <a:rPr lang="en-US" sz="2400" dirty="0"/>
@@ -3872,8 +3860,8 @@
         </p:nvSpPr>
         <p:spPr>
           <a:xfrm>
-            <a:off x="152400" y="6096000"/>
-            <a:ext cx="9072744" cy="646331"/>
+            <a:off x="71256" y="6096000"/>
+            <a:ext cx="9072744" cy="615553"/>
           </a:xfrm>
           <a:prstGeom prst="rect">
             <a:avLst/>
@@ -3885,23 +3873,32 @@
           </a:bodyPr>
           <a:lstStyle/>
           <a:p>
-            <a:r>
-              <a:rPr lang="en-US" b="1" dirty="0" smtClean="0"/>
+            <a:pPr algn="ctr"/>
+            <a:r>
+              <a:rPr lang="en-US" sz="1700" b="1" dirty="0" smtClean="0"/>
               <a:t>Figure 1</a:t>
             </a:r>
             <a:r>
-              <a:rPr lang="en-US" dirty="0" smtClean="0"/>
-              <a:t>. Visual representation of the example </a:t>
-            </a:r>
-            <a:r>
-              <a:rPr lang="en-US" dirty="0" err="1" smtClean="0"/>
+              <a:rPr lang="en-US" sz="1700" dirty="0" smtClean="0"/>
+              <a:t>. </a:t>
+            </a:r>
+            <a:r>
+              <a:rPr lang="en-US" sz="1700" dirty="0" smtClean="0"/>
+              <a:t>Diagrammatic representation </a:t>
+            </a:r>
+            <a:r>
+              <a:rPr lang="en-US" sz="1700" dirty="0" smtClean="0"/>
+              <a:t>of the example </a:t>
+            </a:r>
+            <a:r>
+              <a:rPr lang="en-US" sz="1700" dirty="0" err="1" smtClean="0"/>
               <a:t>ApoE</a:t>
             </a:r>
             <a:r>
-              <a:rPr lang="en-US" dirty="0" smtClean="0"/>
+              <a:rPr lang="en-US" sz="1700" dirty="0" smtClean="0"/>
               <a:t> genotype. Each chromosomal DNA strand shown in blue, and labels highlight each Allele, Haplotype, and Location in the Genotype. </a:t>
             </a:r>
-            <a:endParaRPr lang="en-US" dirty="0"/>
+            <a:endParaRPr lang="en-US" sz="1700" dirty="0"/>
           </a:p>
         </p:txBody>
       </p:sp>
@@ -3915,6 +3912,13 @@
   <p:clrMapOvr>
     <a:masterClrMapping/>
   </p:clrMapOvr>
+  <p:timing>
+    <p:tnLst>
+      <p:par>
+        <p:cTn id="1" dur="indefinite" restart="never" nodeType="tmRoot"/>
+      </p:par>
+    </p:tnLst>
+  </p:timing>
 </p:sld>
 </file>
 
@@ -4237,7 +4241,15 @@
             </a:r>
             <a:r>
               <a:rPr lang="en-US" sz="1400" dirty="0"/>
-              <a:t> A graph-based representation of the VMC JSON model of the </a:t>
+              <a:t> A graph-based representation of the VMC </a:t>
+            </a:r>
+            <a:r>
+              <a:rPr lang="en-US" sz="1400" dirty="0" smtClean="0"/>
+              <a:t>model </a:t>
+            </a:r>
+            <a:r>
+              <a:rPr lang="en-US" sz="1400" dirty="0"/>
+              <a:t>of the </a:t>
             </a:r>
             <a:r>
               <a:rPr lang="en-US" sz="1400" dirty="0" err="1"/>
@@ -4245,7 +4257,23 @@
             </a:r>
             <a:r>
               <a:rPr lang="en-US" sz="1400" dirty="0"/>
-              <a:t> example genotype (i.e. what might look like if had JSON-LD context mapping).  Compare with the GENO-based graph representation in Figure 3. As noted in the Key, the content of each node specifies its IRI, a human readable label, and the 'type' of entity the node represents according to the VMC model.</a:t>
+              <a:t> example genotype </a:t>
+            </a:r>
+            <a:r>
+              <a:rPr lang="en-US" sz="1400" dirty="0" smtClean="0"/>
+              <a:t>(what the data might </a:t>
+            </a:r>
+            <a:r>
+              <a:rPr lang="en-US" sz="1400" dirty="0"/>
+              <a:t>look like </a:t>
+            </a:r>
+            <a:r>
+              <a:rPr lang="en-US" sz="1400" dirty="0" smtClean="0"/>
+              <a:t>as RDF).  </a:t>
+            </a:r>
+            <a:r>
+              <a:rPr lang="en-US" sz="1400" dirty="0"/>
+              <a:t>Compare with the GENO-based graph representation in Figure 3. As noted in the Key, the content of each node specifies its IRI, a human readable label, and the 'type' of entity the node represents according to the VMC model.</a:t>
             </a:r>
           </a:p>
         </p:txBody>
@@ -4260,6 +4288,13 @@
   <p:clrMapOvr>
     <a:masterClrMapping/>
   </p:clrMapOvr>
+  <p:timing>
+    <p:tnLst>
+      <p:par>
+        <p:cTn id="1" dur="indefinite" restart="never" nodeType="tmRoot"/>
+      </p:par>
+    </p:tnLst>
+  </p:timing>
 </p:sld>
 </file>
 
@@ -4280,47 +4315,6 @@
           <a:chExt cx="0" cy="0"/>
         </a:xfrm>
       </p:grpSpPr>
-      <p:pic>
-        <p:nvPicPr>
-          <p:cNvPr id="2050" name="Picture 2" descr="C:\Users\brushm\Desktop\VMC2.jpg"/>
-          <p:cNvPicPr>
-            <a:picLocks noChangeAspect="1" noChangeArrowheads="1"/>
-          </p:cNvPicPr>
-          <p:nvPr/>
-        </p:nvPicPr>
-        <p:blipFill>
-          <a:blip r:embed="rId2" cstate="print">
-            <a:extLst>
-              <a:ext uri="{28A0092B-C50C-407E-A947-70E740481C1C}">
-                <a14:useLocalDpi xmlns:a14="http://schemas.microsoft.com/office/drawing/2010/main" val="0"/>
-              </a:ext>
-            </a:extLst>
-          </a:blip>
-          <a:srcRect/>
-          <a:stretch>
-            <a:fillRect/>
-          </a:stretch>
-        </p:blipFill>
-        <p:spPr bwMode="auto">
-          <a:xfrm>
-            <a:off x="-2408" y="457200"/>
-            <a:ext cx="9146408" cy="4800601"/>
-          </a:xfrm>
-          <a:prstGeom prst="rect">
-            <a:avLst/>
-          </a:prstGeom>
-          <a:noFill/>
-          <a:extLst>
-            <a:ext uri="{909E8E84-426E-40DD-AFC4-6F175D3DCCD1}">
-              <a14:hiddenFill xmlns:a14="http://schemas.microsoft.com/office/drawing/2010/main">
-                <a:solidFill>
-                  <a:srgbClr val="FFFFFF"/>
-                </a:solidFill>
-              </a14:hiddenFill>
-            </a:ext>
-          </a:extLst>
-        </p:spPr>
-      </p:pic>
       <p:sp>
         <p:nvSpPr>
           <p:cNvPr id="7" name="TextBox 6"/>
@@ -4372,7 +4366,7 @@
           <p:nvPr/>
         </p:nvPicPr>
         <p:blipFill rotWithShape="1">
-          <a:blip r:embed="rId3" cstate="print">
+          <a:blip r:embed="rId2" cstate="print">
             <a:extLst>
               <a:ext uri="{28A0092B-C50C-407E-A947-70E740481C1C}">
                 <a14:useLocalDpi xmlns:a14="http://schemas.microsoft.com/office/drawing/2010/main" val="0"/>
@@ -4595,6 +4589,47 @@
           </a:p>
         </p:txBody>
       </p:sp>
+      <p:pic>
+        <p:nvPicPr>
+          <p:cNvPr id="11" name="Picture 2" descr="C:\Users\brushm\AppData\Roaming\PixelMetrics\CaptureWiz\Temp\18.png"/>
+          <p:cNvPicPr>
+            <a:picLocks noChangeAspect="1" noChangeArrowheads="1"/>
+          </p:cNvPicPr>
+          <p:nvPr/>
+        </p:nvPicPr>
+        <p:blipFill>
+          <a:blip r:embed="rId3">
+            <a:extLst>
+              <a:ext uri="{28A0092B-C50C-407E-A947-70E740481C1C}">
+                <a14:useLocalDpi xmlns:a14="http://schemas.microsoft.com/office/drawing/2010/main" val="0"/>
+              </a:ext>
+            </a:extLst>
+          </a:blip>
+          <a:srcRect/>
+          <a:stretch>
+            <a:fillRect/>
+          </a:stretch>
+        </p:blipFill>
+        <p:spPr bwMode="auto">
+          <a:xfrm>
+            <a:off x="3376" y="638537"/>
+            <a:ext cx="9161113" cy="4543063"/>
+          </a:xfrm>
+          <a:prstGeom prst="rect">
+            <a:avLst/>
+          </a:prstGeom>
+          <a:noFill/>
+          <a:extLst>
+            <a:ext uri="{909E8E84-426E-40DD-AFC4-6F175D3DCCD1}">
+              <a14:hiddenFill xmlns:a14="http://schemas.microsoft.com/office/drawing/2010/main">
+                <a:solidFill>
+                  <a:srgbClr val="FFFFFF"/>
+                </a:solidFill>
+              </a14:hiddenFill>
+            </a:ext>
+          </a:extLst>
+        </p:spPr>
+      </p:pic>
     </p:spTree>
     <p:extLst>
       <p:ext uri="{BB962C8B-B14F-4D97-AF65-F5344CB8AC3E}">
@@ -4605,6 +4640,13 @@
   <p:clrMapOvr>
     <a:masterClrMapping/>
   </p:clrMapOvr>
+  <p:timing>
+    <p:tnLst>
+      <p:par>
+        <p:cTn id="1" dur="indefinite" restart="never" nodeType="tmRoot"/>
+      </p:par>
+    </p:tnLst>
+  </p:timing>
 </p:sld>
 </file>
 
@@ -4634,7 +4676,7 @@
         <p:spPr>
           <a:xfrm>
             <a:off x="304800" y="1066800"/>
-            <a:ext cx="8534400" cy="4247317"/>
+            <a:ext cx="8534400" cy="3693319"/>
           </a:xfrm>
           <a:prstGeom prst="rect">
             <a:avLst/>
@@ -4653,81 +4695,16 @@
             </a:r>
             <a:r>
               <a:rPr lang="en-US" dirty="0"/>
-              <a:t>and GENO modeling of how genotypes are composed from haplotypes and alleles is isomorphic (green nodes in each figure). Here, GENO </a:t>
+              <a:t>and GENO modeling of how genotypes are composed from haplotypes and alleles is isomorphic (green nodes in each figure). </a:t>
             </a:r>
             <a:r>
               <a:rPr lang="en-US" dirty="0" smtClean="0"/>
-              <a:t>uses </a:t>
-            </a:r>
-            <a:r>
-              <a:rPr lang="en-US" i="1" dirty="0"/>
-              <a:t>has_part</a:t>
-            </a:r>
-            <a:r>
-              <a:rPr lang="en-US" dirty="0"/>
-              <a:t> relations to link genotypes to more fundamental units of variation (haplotypes and alleles).  </a:t>
-            </a:r>
-            <a:endParaRPr lang="en-US" dirty="0" smtClean="0"/>
-          </a:p>
-          <a:p>
-            <a:pPr algn="just"/>
+              <a:t>Mappings of VMC types and attributes to their corresponding GENO classes and properties, as aligned in the figures, woul</a:t>
+            </a:r>
             <a:r>
               <a:rPr lang="en-US" dirty="0" smtClean="0"/>
-              <a:t>An </a:t>
-            </a:r>
-            <a:r>
-              <a:rPr lang="en-US" dirty="0"/>
-              <a:t>LD-context file mapping </a:t>
-            </a:r>
-            <a:r>
-              <a:rPr lang="en-US" dirty="0" err="1"/>
-              <a:t>vmc:haplotype_id</a:t>
-            </a:r>
-            <a:r>
-              <a:rPr lang="en-US" dirty="0"/>
-              <a:t> and </a:t>
-            </a:r>
-            <a:r>
-              <a:rPr lang="en-US" dirty="0" err="1"/>
-              <a:t>vmc:allele_id</a:t>
-            </a:r>
-            <a:r>
-              <a:rPr lang="en-US" dirty="0"/>
-              <a:t> to </a:t>
-            </a:r>
-            <a:r>
-              <a:rPr lang="en-US" dirty="0" err="1"/>
-              <a:t>geno:has_part</a:t>
-            </a:r>
-            <a:r>
-              <a:rPr lang="en-US" dirty="0"/>
-              <a:t>, and </a:t>
-            </a:r>
-            <a:r>
-              <a:rPr lang="en-US" dirty="0" err="1"/>
-              <a:t>vmc:state</a:t>
-            </a:r>
-            <a:r>
-              <a:rPr lang="en-US" dirty="0"/>
-              <a:t> to </a:t>
-            </a:r>
-            <a:r>
-              <a:rPr lang="en-US" dirty="0" err="1"/>
-              <a:t>geno:has_sequence_string</a:t>
-            </a:r>
-            <a:r>
-              <a:rPr lang="en-US" dirty="0"/>
-              <a:t> would effectively transform this portion of the data from VMC JSON data into GENP-compliant RDF</a:t>
-            </a:r>
-            <a:r>
-              <a:rPr lang="en-US" dirty="0" smtClean="0"/>
-              <a:t>.</a:t>
-            </a:r>
-            <a:r>
-              <a:rPr lang="en-US" dirty="0"/>
-              <a:t> </a:t>
-            </a:r>
-            <a:endParaRPr lang="en-US" dirty="0" smtClean="0"/>
+              <a:t>d effectively transform the ‘partonomy’ portion of the data into a GENO-compliant model.</a:t>
+            </a:r>
           </a:p>
           <a:p>
             <a:pPr algn="just"/>
@@ -4737,7 +4714,15 @@
             <a:pPr algn="just"/>
             <a:r>
               <a:rPr lang="en-US" dirty="0"/>
-              <a:t>By contrast, representation of positional information is not entirely isomorphic (blue nodes). GENO adopts the FALDO model which is similar to VMC in how it creates an entity representing the  mapping to a reference sequence ('Location' in VMC, 'Region' in FALDO), and uses this to define position against an explicitly stated reference sequence. But FALDO model is slightly more verbose in that it creates separate </a:t>
+              <a:t>By contrast, representation of positional information is not entirely isomorphic (blue nodes). GENO adopts the FALDO model which is similar to VMC in how it creates an entity representing </a:t>
+            </a:r>
+            <a:r>
+              <a:rPr lang="en-US" dirty="0" smtClean="0"/>
+              <a:t>the </a:t>
+            </a:r>
+            <a:r>
+              <a:rPr lang="en-US" dirty="0"/>
+              <a:t>mapping to a reference sequence ('Location' in VMC, 'Region' in FALDO), and uses this to define position against an explicitly stated reference sequence. But FALDO model is slightly more verbose in that it creates separate </a:t>
             </a:r>
             <a:r>
               <a:rPr lang="en-US" dirty="0" err="1"/>
@@ -4745,7 +4730,27 @@
             </a:r>
             <a:r>
               <a:rPr lang="en-US" dirty="0"/>
-              <a:t> nodes for begin and end positions (to accommodate use cases where different reference sequences are used to define start and stop coordinates). The reference sequence is link from these Position nodes, rather than their parent Region node.</a:t>
+              <a:t> nodes for begin and end positions (to accommodate use cases where different reference sequences are used to define start and stop coordinates). </a:t>
+            </a:r>
+            <a:r>
+              <a:rPr lang="en-US" dirty="0" smtClean="0"/>
+              <a:t>In the FALDO model the</a:t>
+            </a:r>
+            <a:r>
+              <a:rPr lang="en-US" dirty="0" smtClean="0"/>
+              <a:t> </a:t>
+            </a:r>
+            <a:r>
+              <a:rPr lang="en-US" dirty="0"/>
+              <a:t>reference sequence is </a:t>
+            </a:r>
+            <a:r>
+              <a:rPr lang="en-US" dirty="0" smtClean="0"/>
+              <a:t>linked </a:t>
+            </a:r>
+            <a:r>
+              <a:rPr lang="en-US" dirty="0"/>
+              <a:t>from these Position nodes, rather than their parent Region node.</a:t>
             </a:r>
           </a:p>
         </p:txBody>

</xml_diff>

<commit_message>
fixing issue with FALDO part of apoE figure
</commit_message>
<xml_diff>
--- a/docs/VMC-GENO ApoE example genotype.pptx
+++ b/docs/VMC-GENO ApoE example genotype.pptx
@@ -291,7 +291,7 @@
           <a:p>
             <a:fld id="{035C7BB4-88CA-47C0-B81D-19F53C62A555}" type="datetimeFigureOut">
               <a:rPr lang="en-US" smtClean="0"/>
-              <a:t>10/9/2017</a:t>
+              <a:t>3/21/2018</a:t>
             </a:fld>
             <a:endParaRPr lang="en-US"/>
           </a:p>
@@ -461,7 +461,7 @@
           <a:p>
             <a:fld id="{035C7BB4-88CA-47C0-B81D-19F53C62A555}" type="datetimeFigureOut">
               <a:rPr lang="en-US" smtClean="0"/>
-              <a:t>10/9/2017</a:t>
+              <a:t>3/21/2018</a:t>
             </a:fld>
             <a:endParaRPr lang="en-US"/>
           </a:p>
@@ -641,7 +641,7 @@
           <a:p>
             <a:fld id="{035C7BB4-88CA-47C0-B81D-19F53C62A555}" type="datetimeFigureOut">
               <a:rPr lang="en-US" smtClean="0"/>
-              <a:t>10/9/2017</a:t>
+              <a:t>3/21/2018</a:t>
             </a:fld>
             <a:endParaRPr lang="en-US"/>
           </a:p>
@@ -811,7 +811,7 @@
           <a:p>
             <a:fld id="{035C7BB4-88CA-47C0-B81D-19F53C62A555}" type="datetimeFigureOut">
               <a:rPr lang="en-US" smtClean="0"/>
-              <a:t>10/9/2017</a:t>
+              <a:t>3/21/2018</a:t>
             </a:fld>
             <a:endParaRPr lang="en-US"/>
           </a:p>
@@ -1057,7 +1057,7 @@
           <a:p>
             <a:fld id="{035C7BB4-88CA-47C0-B81D-19F53C62A555}" type="datetimeFigureOut">
               <a:rPr lang="en-US" smtClean="0"/>
-              <a:t>10/9/2017</a:t>
+              <a:t>3/21/2018</a:t>
             </a:fld>
             <a:endParaRPr lang="en-US"/>
           </a:p>
@@ -1345,7 +1345,7 @@
           <a:p>
             <a:fld id="{035C7BB4-88CA-47C0-B81D-19F53C62A555}" type="datetimeFigureOut">
               <a:rPr lang="en-US" smtClean="0"/>
-              <a:t>10/9/2017</a:t>
+              <a:t>3/21/2018</a:t>
             </a:fld>
             <a:endParaRPr lang="en-US"/>
           </a:p>
@@ -1767,7 +1767,7 @@
           <a:p>
             <a:fld id="{035C7BB4-88CA-47C0-B81D-19F53C62A555}" type="datetimeFigureOut">
               <a:rPr lang="en-US" smtClean="0"/>
-              <a:t>10/9/2017</a:t>
+              <a:t>3/21/2018</a:t>
             </a:fld>
             <a:endParaRPr lang="en-US"/>
           </a:p>
@@ -1885,7 +1885,7 @@
           <a:p>
             <a:fld id="{035C7BB4-88CA-47C0-B81D-19F53C62A555}" type="datetimeFigureOut">
               <a:rPr lang="en-US" smtClean="0"/>
-              <a:t>10/9/2017</a:t>
+              <a:t>3/21/2018</a:t>
             </a:fld>
             <a:endParaRPr lang="en-US"/>
           </a:p>
@@ -1980,7 +1980,7 @@
           <a:p>
             <a:fld id="{035C7BB4-88CA-47C0-B81D-19F53C62A555}" type="datetimeFigureOut">
               <a:rPr lang="en-US" smtClean="0"/>
-              <a:t>10/9/2017</a:t>
+              <a:t>3/21/2018</a:t>
             </a:fld>
             <a:endParaRPr lang="en-US"/>
           </a:p>
@@ -2257,7 +2257,7 @@
           <a:p>
             <a:fld id="{035C7BB4-88CA-47C0-B81D-19F53C62A555}" type="datetimeFigureOut">
               <a:rPr lang="en-US" smtClean="0"/>
-              <a:t>10/9/2017</a:t>
+              <a:t>3/21/2018</a:t>
             </a:fld>
             <a:endParaRPr lang="en-US"/>
           </a:p>
@@ -2510,7 +2510,7 @@
           <a:p>
             <a:fld id="{035C7BB4-88CA-47C0-B81D-19F53C62A555}" type="datetimeFigureOut">
               <a:rPr lang="en-US" smtClean="0"/>
-              <a:t>10/9/2017</a:t>
+              <a:t>3/21/2018</a:t>
             </a:fld>
             <a:endParaRPr lang="en-US"/>
           </a:p>
@@ -2723,7 +2723,7 @@
           <a:p>
             <a:fld id="{035C7BB4-88CA-47C0-B81D-19F53C62A555}" type="datetimeFigureOut">
               <a:rPr lang="en-US" smtClean="0"/>
-              <a:t>10/9/2017</a:t>
+              <a:t>3/21/2018</a:t>
             </a:fld>
             <a:endParaRPr lang="en-US"/>
           </a:p>
@@ -3521,11 +3521,7 @@
             </a:pPr>
             <a:r>
               <a:rPr lang="en-US" sz="1400" u="sng" dirty="0" smtClean="0"/>
-              <a:t>rs7412 L</a:t>
-            </a:r>
-            <a:r>
-              <a:rPr lang="en-US" sz="1400" u="sng" dirty="0" smtClean="0"/>
-              <a:t>ocation</a:t>
+              <a:t>rs7412 Location</a:t>
             </a:r>
             <a:endParaRPr lang="en-US" sz="1400" u="sng" dirty="0"/>
           </a:p>
@@ -3601,19 +3597,7 @@
           <a:p>
             <a:r>
               <a:rPr lang="en-US" dirty="0" smtClean="0"/>
-              <a:t>ɛ2 </a:t>
-            </a:r>
-            <a:r>
-              <a:rPr lang="en-US" dirty="0" smtClean="0"/>
-              <a:t>/</a:t>
-            </a:r>
-            <a:r>
-              <a:rPr lang="en-US" dirty="0" smtClean="0"/>
-              <a:t> ɛ3</a:t>
-            </a:r>
-            <a:r>
-              <a:rPr lang="en-US" dirty="0" smtClean="0"/>
-              <a:t> Genotype</a:t>
+              <a:t>ɛ2 / ɛ3 Genotype</a:t>
             </a:r>
             <a:endParaRPr lang="en-US" dirty="0"/>
           </a:p>
@@ -3705,7 +3689,7 @@
         <p:spPr>
           <a:xfrm>
             <a:off x="2112779" y="2514600"/>
-            <a:ext cx="4516621" cy="461665"/>
+            <a:ext cx="5206041" cy="461665"/>
           </a:xfrm>
           <a:prstGeom prst="rect">
             <a:avLst/>
@@ -3724,7 +3708,19 @@
             </a:r>
             <a:r>
               <a:rPr lang="en-US" sz="2400" dirty="0" smtClean="0"/>
-              <a:t>Exemplar </a:t>
+              <a:t>The</a:t>
+            </a:r>
+            <a:r>
+              <a:rPr lang="en-US" sz="2400" b="1" dirty="0" smtClean="0"/>
+              <a:t> </a:t>
+            </a:r>
+            <a:r>
+              <a:rPr lang="en-US" sz="2400" dirty="0"/>
+              <a:t>e</a:t>
+            </a:r>
+            <a:r>
+              <a:rPr lang="en-US" sz="2400" dirty="0" smtClean="0"/>
+              <a:t>xemplar </a:t>
             </a:r>
             <a:r>
               <a:rPr lang="en-US" sz="2400" dirty="0" err="1" smtClean="0"/>
@@ -3732,7 +3728,7 @@
             </a:r>
             <a:r>
               <a:rPr lang="en-US" sz="2400" dirty="0" smtClean="0"/>
-              <a:t> Genotype</a:t>
+              <a:t> ‘Genotype’</a:t>
             </a:r>
             <a:endParaRPr lang="en-US" sz="2400" dirty="0"/>
           </a:p>
@@ -3809,19 +3805,7 @@
             </a:r>
             <a:r>
               <a:rPr lang="en-US" sz="2400" dirty="0" smtClean="0"/>
-              <a:t>ɛ</a:t>
-            </a:r>
-            <a:r>
-              <a:rPr lang="en-US" sz="2400" dirty="0" smtClean="0"/>
-              <a:t>2/</a:t>
-            </a:r>
-            <a:r>
-              <a:rPr lang="en-US" sz="2400" dirty="0" smtClean="0"/>
-              <a:t>ɛ</a:t>
-            </a:r>
-            <a:r>
-              <a:rPr lang="en-US" sz="2400" dirty="0" smtClean="0"/>
-              <a:t>3 </a:t>
+              <a:t>ɛ2/ɛ3 </a:t>
             </a:r>
             <a:r>
               <a:rPr lang="en-US" sz="2400" dirty="0"/>
@@ -3872,8 +3856,8 @@
         </p:nvSpPr>
         <p:spPr>
           <a:xfrm>
-            <a:off x="152400" y="6096000"/>
-            <a:ext cx="9072744" cy="646331"/>
+            <a:off x="71256" y="6096000"/>
+            <a:ext cx="9072744" cy="615553"/>
           </a:xfrm>
           <a:prstGeom prst="rect">
             <a:avLst/>
@@ -3885,36 +3869,44 @@
           </a:bodyPr>
           <a:lstStyle/>
           <a:p>
-            <a:r>
-              <a:rPr lang="en-US" b="1" dirty="0" smtClean="0"/>
+            <a:pPr algn="ctr"/>
+            <a:r>
+              <a:rPr lang="en-US" sz="1700" b="1" dirty="0" smtClean="0"/>
               <a:t>Figure 1</a:t>
             </a:r>
             <a:r>
-              <a:rPr lang="en-US" dirty="0" smtClean="0"/>
-              <a:t>. Visual representation of the example </a:t>
-            </a:r>
-            <a:r>
-              <a:rPr lang="en-US" dirty="0" err="1" smtClean="0"/>
+              <a:rPr lang="en-US" sz="1700" dirty="0" smtClean="0"/>
+              <a:t>. Diagrammatic representation of the example </a:t>
+            </a:r>
+            <a:r>
+              <a:rPr lang="en-US" sz="1700" dirty="0" err="1" smtClean="0"/>
               <a:t>ApoE</a:t>
             </a:r>
             <a:r>
-              <a:rPr lang="en-US" dirty="0" smtClean="0"/>
+              <a:rPr lang="en-US" sz="1700" dirty="0" smtClean="0"/>
               <a:t> genotype. Each chromosomal DNA strand shown in blue, and labels highlight each Allele, Haplotype, and Location in the Genotype. </a:t>
             </a:r>
-            <a:endParaRPr lang="en-US" dirty="0"/>
+            <a:endParaRPr lang="en-US" sz="1700" dirty="0"/>
           </a:p>
         </p:txBody>
       </p:sp>
     </p:spTree>
     <p:extLst>
       <p:ext uri="{BB962C8B-B14F-4D97-AF65-F5344CB8AC3E}">
-        <p14:creationId xmlns:p14="http://schemas.microsoft.com/office/powerpoint/2010/main" val="2983596628"/>
+        <p14:creationId xmlns:p14="http://schemas.microsoft.com/office/powerpoint/2010/main" val="2673264885"/>
       </p:ext>
     </p:extLst>
   </p:cSld>
   <p:clrMapOvr>
     <a:masterClrMapping/>
   </p:clrMapOvr>
+  <p:timing>
+    <p:tnLst>
+      <p:par>
+        <p:cTn id="1" dur="indefinite" restart="never" nodeType="tmRoot"/>
+      </p:par>
+    </p:tnLst>
+  </p:timing>
 </p:sld>
 </file>
 
@@ -4237,7 +4229,15 @@
             </a:r>
             <a:r>
               <a:rPr lang="en-US" sz="1400" dirty="0"/>
-              <a:t> A graph-based representation of the VMC JSON model of the </a:t>
+              <a:t> A graph-based representation of the VMC </a:t>
+            </a:r>
+            <a:r>
+              <a:rPr lang="en-US" sz="1400" dirty="0" smtClean="0"/>
+              <a:t>model </a:t>
+            </a:r>
+            <a:r>
+              <a:rPr lang="en-US" sz="1400" dirty="0"/>
+              <a:t>of the </a:t>
             </a:r>
             <a:r>
               <a:rPr lang="en-US" sz="1400" dirty="0" err="1"/>
@@ -4245,7 +4245,23 @@
             </a:r>
             <a:r>
               <a:rPr lang="en-US" sz="1400" dirty="0"/>
-              <a:t> example genotype (i.e. what might look like if had JSON-LD context mapping).  Compare with the GENO-based graph representation in Figure 3. As noted in the Key, the content of each node specifies its IRI, a human readable label, and the 'type' of entity the node represents according to the VMC model.</a:t>
+              <a:t> example genotype </a:t>
+            </a:r>
+            <a:r>
+              <a:rPr lang="en-US" sz="1400" dirty="0" smtClean="0"/>
+              <a:t>(what the data might </a:t>
+            </a:r>
+            <a:r>
+              <a:rPr lang="en-US" sz="1400" dirty="0"/>
+              <a:t>look like </a:t>
+            </a:r>
+            <a:r>
+              <a:rPr lang="en-US" sz="1400" dirty="0" smtClean="0"/>
+              <a:t>as RDF).  </a:t>
+            </a:r>
+            <a:r>
+              <a:rPr lang="en-US" sz="1400" dirty="0"/>
+              <a:t>Compare with the GENO-based graph representation in Figure 3. As noted in the Key, the content of each node specifies its IRI, a human readable label, and the 'type' of entity the node represents according to the VMC model.</a:t>
             </a:r>
           </a:p>
         </p:txBody>
@@ -4253,13 +4269,20 @@
     </p:spTree>
     <p:extLst>
       <p:ext uri="{BB962C8B-B14F-4D97-AF65-F5344CB8AC3E}">
-        <p14:creationId xmlns:p14="http://schemas.microsoft.com/office/powerpoint/2010/main" val="1994799658"/>
+        <p14:creationId xmlns:p14="http://schemas.microsoft.com/office/powerpoint/2010/main" val="1117168163"/>
       </p:ext>
     </p:extLst>
   </p:cSld>
   <p:clrMapOvr>
     <a:masterClrMapping/>
   </p:clrMapOvr>
+  <p:timing>
+    <p:tnLst>
+      <p:par>
+        <p:cTn id="1" dur="indefinite" restart="never" nodeType="tmRoot"/>
+      </p:par>
+    </p:tnLst>
+  </p:timing>
 </p:sld>
 </file>
 
@@ -4280,47 +4303,6 @@
           <a:chExt cx="0" cy="0"/>
         </a:xfrm>
       </p:grpSpPr>
-      <p:pic>
-        <p:nvPicPr>
-          <p:cNvPr id="2050" name="Picture 2" descr="C:\Users\brushm\Desktop\VMC2.jpg"/>
-          <p:cNvPicPr>
-            <a:picLocks noChangeAspect="1" noChangeArrowheads="1"/>
-          </p:cNvPicPr>
-          <p:nvPr/>
-        </p:nvPicPr>
-        <p:blipFill>
-          <a:blip r:embed="rId2" cstate="print">
-            <a:extLst>
-              <a:ext uri="{28A0092B-C50C-407E-A947-70E740481C1C}">
-                <a14:useLocalDpi xmlns:a14="http://schemas.microsoft.com/office/drawing/2010/main" val="0"/>
-              </a:ext>
-            </a:extLst>
-          </a:blip>
-          <a:srcRect/>
-          <a:stretch>
-            <a:fillRect/>
-          </a:stretch>
-        </p:blipFill>
-        <p:spPr bwMode="auto">
-          <a:xfrm>
-            <a:off x="-2408" y="457200"/>
-            <a:ext cx="9146408" cy="4800601"/>
-          </a:xfrm>
-          <a:prstGeom prst="rect">
-            <a:avLst/>
-          </a:prstGeom>
-          <a:noFill/>
-          <a:extLst>
-            <a:ext uri="{909E8E84-426E-40DD-AFC4-6F175D3DCCD1}">
-              <a14:hiddenFill xmlns:a14="http://schemas.microsoft.com/office/drawing/2010/main">
-                <a:solidFill>
-                  <a:srgbClr val="FFFFFF"/>
-                </a:solidFill>
-              </a14:hiddenFill>
-            </a:ext>
-          </a:extLst>
-        </p:spPr>
-      </p:pic>
       <p:sp>
         <p:nvSpPr>
           <p:cNvPr id="7" name="TextBox 6"/>
@@ -4372,7 +4354,7 @@
           <p:nvPr/>
         </p:nvPicPr>
         <p:blipFill rotWithShape="1">
-          <a:blip r:embed="rId3" cstate="print">
+          <a:blip r:embed="rId2" cstate="print">
             <a:extLst>
               <a:ext uri="{28A0092B-C50C-407E-A947-70E740481C1C}">
                 <a14:useLocalDpi xmlns:a14="http://schemas.microsoft.com/office/drawing/2010/main" val="0"/>
@@ -4595,16 +4577,64 @@
           </a:p>
         </p:txBody>
       </p:sp>
+      <p:pic>
+        <p:nvPicPr>
+          <p:cNvPr id="11" name="Picture 2" descr="C:\Users\brushm\AppData\Roaming\PixelMetrics\CaptureWiz\Temp\18.png"/>
+          <p:cNvPicPr>
+            <a:picLocks noChangeAspect="1" noChangeArrowheads="1"/>
+          </p:cNvPicPr>
+          <p:nvPr/>
+        </p:nvPicPr>
+        <p:blipFill>
+          <a:blip r:embed="rId3">
+            <a:extLst>
+              <a:ext uri="{28A0092B-C50C-407E-A947-70E740481C1C}">
+                <a14:useLocalDpi xmlns:a14="http://schemas.microsoft.com/office/drawing/2010/main" val="0"/>
+              </a:ext>
+            </a:extLst>
+          </a:blip>
+          <a:srcRect/>
+          <a:stretch>
+            <a:fillRect/>
+          </a:stretch>
+        </p:blipFill>
+        <p:spPr bwMode="auto">
+          <a:xfrm>
+            <a:off x="3376" y="638537"/>
+            <a:ext cx="9161113" cy="4543063"/>
+          </a:xfrm>
+          <a:prstGeom prst="rect">
+            <a:avLst/>
+          </a:prstGeom>
+          <a:noFill/>
+          <a:extLst>
+            <a:ext uri="{909E8E84-426E-40DD-AFC4-6F175D3DCCD1}">
+              <a14:hiddenFill xmlns:a14="http://schemas.microsoft.com/office/drawing/2010/main">
+                <a:solidFill>
+                  <a:srgbClr val="FFFFFF"/>
+                </a:solidFill>
+              </a14:hiddenFill>
+            </a:ext>
+          </a:extLst>
+        </p:spPr>
+      </p:pic>
     </p:spTree>
     <p:extLst>
       <p:ext uri="{BB962C8B-B14F-4D97-AF65-F5344CB8AC3E}">
-        <p14:creationId xmlns:p14="http://schemas.microsoft.com/office/powerpoint/2010/main" val="1990780152"/>
+        <p14:creationId xmlns:p14="http://schemas.microsoft.com/office/powerpoint/2010/main" val="934298779"/>
       </p:ext>
     </p:extLst>
   </p:cSld>
   <p:clrMapOvr>
     <a:masterClrMapping/>
   </p:clrMapOvr>
+  <p:timing>
+    <p:tnLst>
+      <p:par>
+        <p:cTn id="1" dur="indefinite" restart="never" nodeType="tmRoot"/>
+      </p:par>
+    </p:tnLst>
+  </p:timing>
 </p:sld>
 </file>
 
@@ -4634,7 +4664,7 @@
         <p:spPr>
           <a:xfrm>
             <a:off x="304800" y="1066800"/>
-            <a:ext cx="8534400" cy="4247317"/>
+            <a:ext cx="8534400" cy="3693319"/>
           </a:xfrm>
           <a:prstGeom prst="rect">
             <a:avLst/>
@@ -4653,81 +4683,12 @@
             </a:r>
             <a:r>
               <a:rPr lang="en-US" dirty="0"/>
-              <a:t>and GENO modeling of how genotypes are composed from haplotypes and alleles is isomorphic (green nodes in each figure). Here, GENO </a:t>
+              <a:t>and GENO modeling of how genotypes are composed from haplotypes and alleles is isomorphic (green nodes in each figure). </a:t>
             </a:r>
             <a:r>
               <a:rPr lang="en-US" dirty="0" smtClean="0"/>
-              <a:t>uses </a:t>
-            </a:r>
-            <a:r>
-              <a:rPr lang="en-US" i="1" dirty="0"/>
-              <a:t>has_part</a:t>
-            </a:r>
-            <a:r>
-              <a:rPr lang="en-US" dirty="0"/>
-              <a:t> relations to link genotypes to more fundamental units of variation (haplotypes and alleles).  </a:t>
-            </a:r>
-            <a:endParaRPr lang="en-US" dirty="0" smtClean="0"/>
-          </a:p>
-          <a:p>
-            <a:pPr algn="just"/>
-            <a:r>
-              <a:rPr lang="en-US" dirty="0" smtClean="0"/>
-              <a:t>An </a:t>
-            </a:r>
-            <a:r>
-              <a:rPr lang="en-US" dirty="0"/>
-              <a:t>LD-context file mapping </a:t>
-            </a:r>
-            <a:r>
-              <a:rPr lang="en-US" dirty="0" err="1"/>
-              <a:t>vmc:haplotype_id</a:t>
-            </a:r>
-            <a:r>
-              <a:rPr lang="en-US" dirty="0"/>
-              <a:t> and </a:t>
-            </a:r>
-            <a:r>
-              <a:rPr lang="en-US" dirty="0" err="1"/>
-              <a:t>vmc:allele_id</a:t>
-            </a:r>
-            <a:r>
-              <a:rPr lang="en-US" dirty="0"/>
-              <a:t> to </a:t>
-            </a:r>
-            <a:r>
-              <a:rPr lang="en-US" dirty="0" err="1"/>
-              <a:t>geno:has_part</a:t>
-            </a:r>
-            <a:r>
-              <a:rPr lang="en-US" dirty="0"/>
-              <a:t>, and </a:t>
-            </a:r>
-            <a:r>
-              <a:rPr lang="en-US" dirty="0" err="1"/>
-              <a:t>vmc:state</a:t>
-            </a:r>
-            <a:r>
-              <a:rPr lang="en-US" dirty="0"/>
-              <a:t> to </a:t>
-            </a:r>
-            <a:r>
-              <a:rPr lang="en-US" dirty="0" err="1"/>
-              <a:t>geno:has_sequence_string</a:t>
-            </a:r>
-            <a:r>
-              <a:rPr lang="en-US" dirty="0"/>
-              <a:t> would effectively transform this portion of the data from VMC JSON data into GENP-compliant RDF</a:t>
-            </a:r>
-            <a:r>
-              <a:rPr lang="en-US" dirty="0" smtClean="0"/>
-              <a:t>.</a:t>
-            </a:r>
-            <a:r>
-              <a:rPr lang="en-US" dirty="0"/>
-              <a:t> </a:t>
-            </a:r>
-            <a:endParaRPr lang="en-US" dirty="0" smtClean="0"/>
+              <a:t>Mappings of VMC types and attributes to their corresponding GENO classes and properties, as aligned in the figures, would effectively transform the ‘partonomy’ portion of the data into a GENO-compliant model.</a:t>
+            </a:r>
           </a:p>
           <a:p>
             <a:pPr algn="just"/>
@@ -4737,7 +4698,15 @@
             <a:pPr algn="just"/>
             <a:r>
               <a:rPr lang="en-US" dirty="0"/>
-              <a:t>By contrast, representation of positional information is not entirely isomorphic (blue nodes). GENO adopts the FALDO model which is similar to VMC in how it creates an entity representing the  mapping to a reference sequence ('Location' in VMC, 'Region' in FALDO), and uses this to define position against an explicitly stated reference sequence. But FALDO model is slightly more verbose in that it creates separate </a:t>
+              <a:t>By contrast, representation of positional information is not entirely isomorphic (blue nodes). GENO adopts the FALDO model which is similar to VMC in how it creates an entity representing </a:t>
+            </a:r>
+            <a:r>
+              <a:rPr lang="en-US" dirty="0" smtClean="0"/>
+              <a:t>the </a:t>
+            </a:r>
+            <a:r>
+              <a:rPr lang="en-US" dirty="0"/>
+              <a:t>mapping to a reference sequence ('Location' in VMC, 'Region' in FALDO), and uses this to define position against an explicitly stated reference sequence. But FALDO model is slightly more verbose in that it creates separate </a:t>
             </a:r>
             <a:r>
               <a:rPr lang="en-US" dirty="0" err="1"/>
@@ -4745,7 +4714,23 @@
             </a:r>
             <a:r>
               <a:rPr lang="en-US" dirty="0"/>
-              <a:t> nodes for begin and end positions (to accommodate use cases where different reference sequences are used to define start and stop coordinates). The reference sequence is link from these Position nodes, rather than their parent Region node.</a:t>
+              <a:t> nodes for begin and end positions (to accommodate use cases where different reference sequences are used to define start and stop coordinates). </a:t>
+            </a:r>
+            <a:r>
+              <a:rPr lang="en-US" dirty="0" smtClean="0"/>
+              <a:t>In the FALDO model the </a:t>
+            </a:r>
+            <a:r>
+              <a:rPr lang="en-US" dirty="0"/>
+              <a:t>reference sequence is </a:t>
+            </a:r>
+            <a:r>
+              <a:rPr lang="en-US" dirty="0" smtClean="0"/>
+              <a:t>linked </a:t>
+            </a:r>
+            <a:r>
+              <a:rPr lang="en-US" dirty="0"/>
+              <a:t>from these Position nodes, rather than their parent Region node.</a:t>
             </a:r>
           </a:p>
         </p:txBody>
@@ -4783,7 +4768,7 @@
     </p:spTree>
     <p:extLst>
       <p:ext uri="{BB962C8B-B14F-4D97-AF65-F5344CB8AC3E}">
-        <p14:creationId xmlns:p14="http://schemas.microsoft.com/office/powerpoint/2010/main" val="3418368632"/>
+        <p14:creationId xmlns:p14="http://schemas.microsoft.com/office/powerpoint/2010/main" val="911661872"/>
       </p:ext>
     </p:extLst>
   </p:cSld>

</xml_diff>